<commit_message>
Update UG/DG and add first draft of my portfolio (#205)
- Add our portfolio links to `AboutUs.adoc`.
- Add sequence diagram for storage.
- First draft of my portfolio.
- Revive UG for help, clear, undo, redo and history.
- Add field restriction table in UG.
- Update setup's UG.
- Explicitly list down major and focus area supported by setup and suggest.
- Update UI.png.
- Add screenshot for find command.
</commit_message>
<xml_diff>
--- a/docs/diagrams/ModelComponentClassDiagram.pptx
+++ b/docs/diagrams/ModelComponentClassDiagram.pptx
@@ -208,7 +208,7 @@
           <a:p>
             <a:fld id="{F5CC4B3F-88C1-4FFA-B1B6-F41C21DC6924}" type="datetimeFigureOut">
               <a:rPr lang="en-US" smtClean="0"/>
-              <a:t>10/30/18</a:t>
+              <a:t>11/10/2018</a:t>
             </a:fld>
             <a:endParaRPr lang="en-US"/>
           </a:p>
@@ -654,7 +654,7 @@
           <a:p>
             <a:fld id="{78C97017-6FC3-485B-9764-EAC9E56C1D49}" type="datetimeFigureOut">
               <a:rPr lang="en-US" smtClean="0"/>
-              <a:t>10/30/18</a:t>
+              <a:t>11/10/2018</a:t>
             </a:fld>
             <a:endParaRPr lang="en-US"/>
           </a:p>
@@ -822,7 +822,7 @@
           <a:p>
             <a:fld id="{78C97017-6FC3-485B-9764-EAC9E56C1D49}" type="datetimeFigureOut">
               <a:rPr lang="en-US" smtClean="0"/>
-              <a:t>10/30/18</a:t>
+              <a:t>11/10/2018</a:t>
             </a:fld>
             <a:endParaRPr lang="en-US"/>
           </a:p>
@@ -1000,7 +1000,7 @@
           <a:p>
             <a:fld id="{78C97017-6FC3-485B-9764-EAC9E56C1D49}" type="datetimeFigureOut">
               <a:rPr lang="en-US" smtClean="0"/>
-              <a:t>10/30/18</a:t>
+              <a:t>11/10/2018</a:t>
             </a:fld>
             <a:endParaRPr lang="en-US"/>
           </a:p>
@@ -1168,7 +1168,7 @@
           <a:p>
             <a:fld id="{78C97017-6FC3-485B-9764-EAC9E56C1D49}" type="datetimeFigureOut">
               <a:rPr lang="en-US" smtClean="0"/>
-              <a:t>10/30/18</a:t>
+              <a:t>11/10/2018</a:t>
             </a:fld>
             <a:endParaRPr lang="en-US"/>
           </a:p>
@@ -1413,7 +1413,7 @@
           <a:p>
             <a:fld id="{78C97017-6FC3-485B-9764-EAC9E56C1D49}" type="datetimeFigureOut">
               <a:rPr lang="en-US" smtClean="0"/>
-              <a:t>10/30/18</a:t>
+              <a:t>11/10/2018</a:t>
             </a:fld>
             <a:endParaRPr lang="en-US"/>
           </a:p>
@@ -1698,7 +1698,7 @@
           <a:p>
             <a:fld id="{78C97017-6FC3-485B-9764-EAC9E56C1D49}" type="datetimeFigureOut">
               <a:rPr lang="en-US" smtClean="0"/>
-              <a:t>10/30/18</a:t>
+              <a:t>11/10/2018</a:t>
             </a:fld>
             <a:endParaRPr lang="en-US"/>
           </a:p>
@@ -2117,7 +2117,7 @@
           <a:p>
             <a:fld id="{78C97017-6FC3-485B-9764-EAC9E56C1D49}" type="datetimeFigureOut">
               <a:rPr lang="en-US" smtClean="0"/>
-              <a:t>10/30/18</a:t>
+              <a:t>11/10/2018</a:t>
             </a:fld>
             <a:endParaRPr lang="en-US"/>
           </a:p>
@@ -2234,7 +2234,7 @@
           <a:p>
             <a:fld id="{78C97017-6FC3-485B-9764-EAC9E56C1D49}" type="datetimeFigureOut">
               <a:rPr lang="en-US" smtClean="0"/>
-              <a:t>10/30/18</a:t>
+              <a:t>11/10/2018</a:t>
             </a:fld>
             <a:endParaRPr lang="en-US"/>
           </a:p>
@@ -2329,7 +2329,7 @@
           <a:p>
             <a:fld id="{78C97017-6FC3-485B-9764-EAC9E56C1D49}" type="datetimeFigureOut">
               <a:rPr lang="en-US" smtClean="0"/>
-              <a:t>10/30/18</a:t>
+              <a:t>11/10/2018</a:t>
             </a:fld>
             <a:endParaRPr lang="en-US"/>
           </a:p>
@@ -2604,7 +2604,7 @@
           <a:p>
             <a:fld id="{78C97017-6FC3-485B-9764-EAC9E56C1D49}" type="datetimeFigureOut">
               <a:rPr lang="en-US" smtClean="0"/>
-              <a:t>10/30/18</a:t>
+              <a:t>11/10/2018</a:t>
             </a:fld>
             <a:endParaRPr lang="en-US"/>
           </a:p>
@@ -2856,7 +2856,7 @@
           <a:p>
             <a:fld id="{78C97017-6FC3-485B-9764-EAC9E56C1D49}" type="datetimeFigureOut">
               <a:rPr lang="en-US" smtClean="0"/>
-              <a:t>10/30/18</a:t>
+              <a:t>11/10/2018</a:t>
             </a:fld>
             <a:endParaRPr lang="en-US"/>
           </a:p>
@@ -3067,7 +3067,7 @@
           <a:p>
             <a:fld id="{78C97017-6FC3-485B-9764-EAC9E56C1D49}" type="datetimeFigureOut">
               <a:rPr lang="en-US" smtClean="0"/>
-              <a:t>10/30/18</a:t>
+              <a:t>11/10/2018</a:t>
             </a:fld>
             <a:endParaRPr lang="en-US"/>
           </a:p>
@@ -3450,7 +3450,7 @@
         </p:nvSpPr>
         <p:spPr>
           <a:xfrm>
-            <a:off x="990600" y="1600200"/>
+            <a:off x="1018021" y="1597502"/>
             <a:ext cx="7848599" cy="4114800"/>
           </a:xfrm>
           <a:prstGeom prst="roundRect">
@@ -3511,7 +3511,7 @@
         </p:nvSpPr>
         <p:spPr>
           <a:xfrm>
-            <a:off x="3402165" y="3387040"/>
+            <a:off x="3270868" y="3878069"/>
             <a:ext cx="1093635" cy="346760"/>
           </a:xfrm>
           <a:prstGeom prst="rect">
@@ -3788,14 +3788,12 @@
           <p:cNvPr id="58" name="Straight Arrow Connector 57"/>
           <p:cNvCxnSpPr>
             <a:cxnSpLocks/>
-            <a:stCxn id="42" idx="3"/>
-            <a:endCxn id="2" idx="1"/>
           </p:cNvCxnSpPr>
           <p:nvPr/>
         </p:nvCxnSpPr>
         <p:spPr>
           <a:xfrm>
-            <a:off x="2555513" y="3555765"/>
+            <a:off x="2479579" y="4046794"/>
             <a:ext cx="846652" cy="4655"/>
           </a:xfrm>
           <a:prstGeom prst="straightConnector1">
@@ -3919,7 +3917,7 @@
         </p:nvSpPr>
         <p:spPr>
           <a:xfrm>
-            <a:off x="2319465" y="3428999"/>
+            <a:off x="2309855" y="3896574"/>
             <a:ext cx="236048" cy="253532"/>
           </a:xfrm>
           <a:prstGeom prst="flowChartDecision">
@@ -4992,7 +4990,7 @@
         </p:nvSpPr>
         <p:spPr>
           <a:xfrm>
-            <a:off x="2571096" y="3355477"/>
+            <a:off x="3639308" y="3492545"/>
             <a:ext cx="189257" cy="178683"/>
           </a:xfrm>
           <a:prstGeom prst="rect">
@@ -5305,20 +5303,17 @@
           </p:cNvPr>
           <p:cNvCxnSpPr>
             <a:cxnSpLocks/>
-            <a:stCxn id="72" idx="3"/>
-            <a:endCxn id="67" idx="1"/>
+            <a:stCxn id="72" idx="2"/>
           </p:cNvCxnSpPr>
           <p:nvPr/>
         </p:nvCxnSpPr>
         <p:spPr>
-          <a:xfrm>
-            <a:off x="2562581" y="4084708"/>
-            <a:ext cx="839584" cy="3950"/>
-          </a:xfrm>
-          <a:prstGeom prst="bentConnector3">
-            <a:avLst>
-              <a:gd name="adj1" fmla="val 50000"/>
-            </a:avLst>
+          <a:xfrm rot="16200000" flipH="1">
+            <a:off x="3504162" y="3310379"/>
+            <a:ext cx="283110" cy="405936"/>
+          </a:xfrm>
+          <a:prstGeom prst="bentConnector2">
+            <a:avLst/>
           </a:prstGeom>
           <a:ln w="19050">
             <a:solidFill>
@@ -5358,7 +5353,7 @@
         </p:nvSpPr>
         <p:spPr>
           <a:xfrm>
-            <a:off x="3402165" y="3915278"/>
+            <a:off x="3848686" y="3440724"/>
             <a:ext cx="1093635" cy="346760"/>
           </a:xfrm>
           <a:prstGeom prst="rect">
@@ -5423,7 +5418,7 @@
         </p:nvSpPr>
         <p:spPr>
           <a:xfrm>
-            <a:off x="2326533" y="3998018"/>
+            <a:off x="3324725" y="3198412"/>
             <a:ext cx="236048" cy="173380"/>
           </a:xfrm>
           <a:prstGeom prst="flowChartDecision">
@@ -5475,9 +5470,9 @@
           <p:nvPr/>
         </p:nvSpPr>
         <p:spPr>
-          <a:xfrm>
-            <a:off x="2567323" y="3961307"/>
-            <a:ext cx="189257" cy="178683"/>
+          <a:xfrm flipH="1">
+            <a:off x="3170182" y="4201670"/>
+            <a:ext cx="88352" cy="598634"/>
           </a:xfrm>
           <a:prstGeom prst="rect">
             <a:avLst/>

</xml_diff>